<commit_message>
edited existing diagrams in DG
</commit_message>
<xml_diff>
--- a/docs/diagrams/ModelComponentClassDiagram.pptx
+++ b/docs/diagrams/ModelComponentClassDiagram.pptx
@@ -208,7 +208,7 @@
           <a:p>
             <a:fld id="{F5CC4B3F-88C1-4FFA-B1B6-F41C21DC6924}" type="datetimeFigureOut">
               <a:rPr lang="en-US" smtClean="0"/>
-              <a:t>11/10/17</a:t>
+              <a:t>11/12/17</a:t>
             </a:fld>
             <a:endParaRPr lang="en-US"/>
           </a:p>
@@ -657,7 +657,7 @@
           <a:p>
             <a:fld id="{78C97017-6FC3-485B-9764-EAC9E56C1D49}" type="datetimeFigureOut">
               <a:rPr lang="en-US" smtClean="0"/>
-              <a:t>11/10/17</a:t>
+              <a:t>11/12/17</a:t>
             </a:fld>
             <a:endParaRPr lang="en-US"/>
           </a:p>
@@ -827,7 +827,7 @@
           <a:p>
             <a:fld id="{78C97017-6FC3-485B-9764-EAC9E56C1D49}" type="datetimeFigureOut">
               <a:rPr lang="en-US" smtClean="0"/>
-              <a:t>11/10/17</a:t>
+              <a:t>11/12/17</a:t>
             </a:fld>
             <a:endParaRPr lang="en-US"/>
           </a:p>
@@ -1007,7 +1007,7 @@
           <a:p>
             <a:fld id="{78C97017-6FC3-485B-9764-EAC9E56C1D49}" type="datetimeFigureOut">
               <a:rPr lang="en-US" smtClean="0"/>
-              <a:t>11/10/17</a:t>
+              <a:t>11/12/17</a:t>
             </a:fld>
             <a:endParaRPr lang="en-US"/>
           </a:p>
@@ -1177,7 +1177,7 @@
           <a:p>
             <a:fld id="{78C97017-6FC3-485B-9764-EAC9E56C1D49}" type="datetimeFigureOut">
               <a:rPr lang="en-US" smtClean="0"/>
-              <a:t>11/10/17</a:t>
+              <a:t>11/12/17</a:t>
             </a:fld>
             <a:endParaRPr lang="en-US"/>
           </a:p>
@@ -1423,7 +1423,7 @@
           <a:p>
             <a:fld id="{78C97017-6FC3-485B-9764-EAC9E56C1D49}" type="datetimeFigureOut">
               <a:rPr lang="en-US" smtClean="0"/>
-              <a:t>11/10/17</a:t>
+              <a:t>11/12/17</a:t>
             </a:fld>
             <a:endParaRPr lang="en-US"/>
           </a:p>
@@ -1711,7 +1711,7 @@
           <a:p>
             <a:fld id="{78C97017-6FC3-485B-9764-EAC9E56C1D49}" type="datetimeFigureOut">
               <a:rPr lang="en-US" smtClean="0"/>
-              <a:t>11/10/17</a:t>
+              <a:t>11/12/17</a:t>
             </a:fld>
             <a:endParaRPr lang="en-US"/>
           </a:p>
@@ -2133,7 +2133,7 @@
           <a:p>
             <a:fld id="{78C97017-6FC3-485B-9764-EAC9E56C1D49}" type="datetimeFigureOut">
               <a:rPr lang="en-US" smtClean="0"/>
-              <a:t>11/10/17</a:t>
+              <a:t>11/12/17</a:t>
             </a:fld>
             <a:endParaRPr lang="en-US"/>
           </a:p>
@@ -2251,7 +2251,7 @@
           <a:p>
             <a:fld id="{78C97017-6FC3-485B-9764-EAC9E56C1D49}" type="datetimeFigureOut">
               <a:rPr lang="en-US" smtClean="0"/>
-              <a:t>11/10/17</a:t>
+              <a:t>11/12/17</a:t>
             </a:fld>
             <a:endParaRPr lang="en-US"/>
           </a:p>
@@ -2346,7 +2346,7 @@
           <a:p>
             <a:fld id="{78C97017-6FC3-485B-9764-EAC9E56C1D49}" type="datetimeFigureOut">
               <a:rPr lang="en-US" smtClean="0"/>
-              <a:t>11/10/17</a:t>
+              <a:t>11/12/17</a:t>
             </a:fld>
             <a:endParaRPr lang="en-US"/>
           </a:p>
@@ -2623,7 +2623,7 @@
           <a:p>
             <a:fld id="{78C97017-6FC3-485B-9764-EAC9E56C1D49}" type="datetimeFigureOut">
               <a:rPr lang="en-US" smtClean="0"/>
-              <a:t>11/10/17</a:t>
+              <a:t>11/12/17</a:t>
             </a:fld>
             <a:endParaRPr lang="en-US"/>
           </a:p>
@@ -2876,7 +2876,7 @@
           <a:p>
             <a:fld id="{78C97017-6FC3-485B-9764-EAC9E56C1D49}" type="datetimeFigureOut">
               <a:rPr lang="en-US" smtClean="0"/>
-              <a:t>11/10/17</a:t>
+              <a:t>11/12/17</a:t>
             </a:fld>
             <a:endParaRPr lang="en-US"/>
           </a:p>
@@ -3089,7 +3089,7 @@
           <a:p>
             <a:fld id="{78C97017-6FC3-485B-9764-EAC9E56C1D49}" type="datetimeFigureOut">
               <a:rPr lang="en-US" smtClean="0"/>
-              <a:t>11/10/17</a:t>
+              <a:t>11/12/17</a:t>
             </a:fld>
             <a:endParaRPr lang="en-US"/>
           </a:p>
@@ -3473,7 +3473,7 @@
         <p:spPr>
           <a:xfrm>
             <a:off x="1119865" y="1727200"/>
-            <a:ext cx="7490735" cy="2997200"/>
+            <a:ext cx="7490735" cy="3759200"/>
           </a:xfrm>
           <a:prstGeom prst="roundRect">
             <a:avLst>
@@ -3653,8 +3653,8 @@
         </p:nvCxnSpPr>
         <p:spPr>
           <a:xfrm flipV="1">
-            <a:off x="6477000" y="3194131"/>
-            <a:ext cx="95385" cy="416514"/>
+            <a:off x="6477131" y="3156497"/>
+            <a:ext cx="85752" cy="298852"/>
           </a:xfrm>
           <a:prstGeom prst="bentConnector2">
             <a:avLst/>
@@ -3699,7 +3699,7 @@
           </a:xfrm>
           <a:prstGeom prst="bentConnector4">
             <a:avLst>
-              <a:gd name="adj1" fmla="val -101829"/>
+              <a:gd name="adj1" fmla="val -66320"/>
               <a:gd name="adj2" fmla="val 99976"/>
             </a:avLst>
           </a:prstGeom>
@@ -3894,7 +3894,7 @@
         </p:nvSpPr>
         <p:spPr>
           <a:xfrm rot="5400000" flipV="1">
-            <a:off x="6253986" y="3522883"/>
+            <a:off x="6254117" y="3367587"/>
             <a:ext cx="270504" cy="175523"/>
           </a:xfrm>
           <a:prstGeom prst="triangle">
@@ -4743,7 +4743,7 @@
         </p:nvSpPr>
         <p:spPr>
           <a:xfrm>
-            <a:off x="5128257" y="3429000"/>
+            <a:off x="5128637" y="3302791"/>
             <a:ext cx="1156969" cy="346760"/>
           </a:xfrm>
           <a:prstGeom prst="rect">
@@ -5447,7 +5447,7 @@
         </p:nvSpPr>
         <p:spPr>
           <a:xfrm>
-            <a:off x="2057401" y="4239491"/>
+            <a:off x="2004946" y="4814814"/>
             <a:ext cx="1066800" cy="346760"/>
           </a:xfrm>
           <a:prstGeom prst="rect">
@@ -5488,7 +5488,7 @@
               <a:t>&lt;&lt;interface&gt;&gt;</a:t>
             </a:r>
             <a:r>
-              <a:rPr lang="en-US" sz="1050">
+              <a:rPr lang="en-US" sz="1050" dirty="0">
                 <a:solidFill>
                   <a:srgbClr val="7030A0"/>
                 </a:solidFill>
@@ -5496,7 +5496,7 @@
               <a:t/>
             </a:r>
             <a:br>
-              <a:rPr lang="en-US" sz="1050">
+              <a:rPr lang="en-US" sz="1050" dirty="0">
                 <a:solidFill>
                   <a:srgbClr val="7030A0"/>
                 </a:solidFill>
@@ -5522,15 +5522,14 @@
         <p:nvCxnSpPr>
           <p:cNvPr id="124" name="Elbow Connector 122"/>
           <p:cNvCxnSpPr>
-            <a:stCxn id="119" idx="1"/>
             <a:endCxn id="122" idx="1"/>
           </p:cNvCxnSpPr>
           <p:nvPr/>
         </p:nvCxnSpPr>
         <p:spPr>
           <a:xfrm rot="16200000" flipH="1">
-            <a:off x="1364475" y="3719944"/>
-            <a:ext cx="831471" cy="554381"/>
+            <a:off x="1049985" y="4033233"/>
+            <a:ext cx="1367354" cy="542567"/>
           </a:xfrm>
           <a:prstGeom prst="bentConnector2">
             <a:avLst/>
@@ -6009,6 +6008,847 @@
           </a:fontRef>
         </p:style>
       </p:cxnSp>
+      <p:cxnSp>
+        <p:nvCxnSpPr>
+          <p:cNvPr id="104" name="Elbow Connector 103"/>
+          <p:cNvCxnSpPr/>
+          <p:nvPr/>
+        </p:nvCxnSpPr>
+        <p:spPr>
+          <a:xfrm rot="16200000" flipH="1">
+            <a:off x="3763326" y="3567537"/>
+            <a:ext cx="1312160" cy="125447"/>
+          </a:xfrm>
+          <a:prstGeom prst="bentConnector3">
+            <a:avLst>
+              <a:gd name="adj1" fmla="val 99874"/>
+            </a:avLst>
+          </a:prstGeom>
+          <a:ln w="19050">
+            <a:solidFill>
+              <a:srgbClr val="7030A0"/>
+            </a:solidFill>
+            <a:headEnd type="none" w="med" len="med"/>
+            <a:tailEnd type="arrow" w="med" len="med"/>
+          </a:ln>
+          <a:effectLst/>
+        </p:spPr>
+        <p:style>
+          <a:lnRef idx="1">
+            <a:schemeClr val="accent2"/>
+          </a:lnRef>
+          <a:fillRef idx="2">
+            <a:schemeClr val="accent2"/>
+          </a:fillRef>
+          <a:effectRef idx="1">
+            <a:schemeClr val="accent2"/>
+          </a:effectRef>
+          <a:fontRef idx="minor">
+            <a:schemeClr val="dk1"/>
+          </a:fontRef>
+        </p:style>
+      </p:cxnSp>
+      <p:sp>
+        <p:nvSpPr>
+          <p:cNvPr id="110" name="Rectangle 8"/>
+          <p:cNvSpPr/>
+          <p:nvPr/>
+        </p:nvSpPr>
+        <p:spPr>
+          <a:xfrm>
+            <a:off x="4487017" y="4138120"/>
+            <a:ext cx="1156969" cy="346760"/>
+          </a:xfrm>
+          <a:prstGeom prst="rect">
+            <a:avLst/>
+          </a:prstGeom>
+          <a:ln w="19050">
+            <a:solidFill>
+              <a:srgbClr val="7030A0"/>
+            </a:solidFill>
+          </a:ln>
+          <a:effectLst/>
+        </p:spPr>
+        <p:style>
+          <a:lnRef idx="1">
+            <a:schemeClr val="accent4"/>
+          </a:lnRef>
+          <a:fillRef idx="2">
+            <a:schemeClr val="accent4"/>
+          </a:fillRef>
+          <a:effectRef idx="1">
+            <a:schemeClr val="accent4"/>
+          </a:effectRef>
+          <a:fontRef idx="minor">
+            <a:schemeClr val="dk1"/>
+          </a:fontRef>
+        </p:style>
+        <p:txBody>
+          <a:bodyPr rtlCol="0" anchor="ctr"/>
+          <a:lstStyle/>
+          <a:p>
+            <a:pPr algn="ctr"/>
+            <a:r>
+              <a:rPr lang="en-US" sz="1050" dirty="0" err="1" smtClean="0">
+                <a:solidFill>
+                  <a:srgbClr val="7030A0"/>
+                </a:solidFill>
+              </a:rPr>
+              <a:t>UniqueTaskList</a:t>
+            </a:r>
+            <a:endParaRPr lang="en-SG" sz="1050" dirty="0">
+              <a:solidFill>
+                <a:srgbClr val="7030A0"/>
+              </a:solidFill>
+            </a:endParaRPr>
+          </a:p>
+        </p:txBody>
+      </p:sp>
+      <p:sp>
+        <p:nvSpPr>
+          <p:cNvPr id="111" name="Flowchart: Decision 96"/>
+          <p:cNvSpPr/>
+          <p:nvPr/>
+        </p:nvSpPr>
+        <p:spPr>
+          <a:xfrm>
+            <a:off x="5666365" y="4224810"/>
+            <a:ext cx="236048" cy="173380"/>
+          </a:xfrm>
+          <a:prstGeom prst="flowChartDecision">
+            <a:avLst/>
+          </a:prstGeom>
+          <a:noFill/>
+          <a:ln w="19050">
+            <a:solidFill>
+              <a:srgbClr val="7030A0"/>
+            </a:solidFill>
+          </a:ln>
+          <a:effectLst/>
+        </p:spPr>
+        <p:style>
+          <a:lnRef idx="1">
+            <a:schemeClr val="accent6"/>
+          </a:lnRef>
+          <a:fillRef idx="2">
+            <a:schemeClr val="accent6"/>
+          </a:fillRef>
+          <a:effectRef idx="1">
+            <a:schemeClr val="accent6"/>
+          </a:effectRef>
+          <a:fontRef idx="minor">
+            <a:schemeClr val="dk1"/>
+          </a:fontRef>
+        </p:style>
+        <p:txBody>
+          <a:bodyPr rtlCol="0" anchor="ctr"/>
+          <a:lstStyle/>
+          <a:p>
+            <a:pPr algn="ctr"/>
+            <a:endParaRPr lang="en-US" sz="1050"/>
+          </a:p>
+        </p:txBody>
+      </p:sp>
+      <p:cxnSp>
+        <p:nvCxnSpPr>
+          <p:cNvPr id="112" name="Elbow Connector 111"/>
+          <p:cNvCxnSpPr/>
+          <p:nvPr/>
+        </p:nvCxnSpPr>
+        <p:spPr>
+          <a:xfrm>
+            <a:off x="5903659" y="4311500"/>
+            <a:ext cx="434402" cy="777"/>
+          </a:xfrm>
+          <a:prstGeom prst="bentConnector3">
+            <a:avLst/>
+          </a:prstGeom>
+          <a:ln w="19050">
+            <a:solidFill>
+              <a:srgbClr val="7030A0"/>
+            </a:solidFill>
+            <a:headEnd type="none" w="med" len="med"/>
+            <a:tailEnd type="arrow" w="med" len="med"/>
+          </a:ln>
+          <a:effectLst/>
+        </p:spPr>
+        <p:style>
+          <a:lnRef idx="1">
+            <a:schemeClr val="accent2"/>
+          </a:lnRef>
+          <a:fillRef idx="2">
+            <a:schemeClr val="accent2"/>
+          </a:fillRef>
+          <a:effectRef idx="1">
+            <a:schemeClr val="accent2"/>
+          </a:effectRef>
+          <a:fontRef idx="minor">
+            <a:schemeClr val="dk1"/>
+          </a:fontRef>
+        </p:style>
+      </p:cxnSp>
+      <p:sp>
+        <p:nvSpPr>
+          <p:cNvPr id="113" name="Rectangle 8"/>
+          <p:cNvSpPr/>
+          <p:nvPr/>
+        </p:nvSpPr>
+        <p:spPr>
+          <a:xfrm>
+            <a:off x="6338061" y="4174730"/>
+            <a:ext cx="708186" cy="346760"/>
+          </a:xfrm>
+          <a:prstGeom prst="rect">
+            <a:avLst/>
+          </a:prstGeom>
+          <a:ln w="19050">
+            <a:solidFill>
+              <a:srgbClr val="7030A0"/>
+            </a:solidFill>
+          </a:ln>
+          <a:effectLst/>
+        </p:spPr>
+        <p:style>
+          <a:lnRef idx="1">
+            <a:schemeClr val="accent4"/>
+          </a:lnRef>
+          <a:fillRef idx="2">
+            <a:schemeClr val="accent4"/>
+          </a:fillRef>
+          <a:effectRef idx="1">
+            <a:schemeClr val="accent4"/>
+          </a:effectRef>
+          <a:fontRef idx="minor">
+            <a:schemeClr val="dk1"/>
+          </a:fontRef>
+        </p:style>
+        <p:txBody>
+          <a:bodyPr rtlCol="0" anchor="ctr"/>
+          <a:lstStyle/>
+          <a:p>
+            <a:pPr algn="ctr"/>
+            <a:r>
+              <a:rPr lang="en-US" sz="1050" dirty="0" smtClean="0">
+                <a:solidFill>
+                  <a:srgbClr val="7030A0"/>
+                </a:solidFill>
+              </a:rPr>
+              <a:t>Task</a:t>
+            </a:r>
+            <a:endParaRPr lang="en-SG" sz="1050" dirty="0">
+              <a:solidFill>
+                <a:srgbClr val="7030A0"/>
+              </a:solidFill>
+            </a:endParaRPr>
+          </a:p>
+        </p:txBody>
+      </p:sp>
+      <p:sp>
+        <p:nvSpPr>
+          <p:cNvPr id="115" name="Flowchart: Decision 96"/>
+          <p:cNvSpPr/>
+          <p:nvPr/>
+        </p:nvSpPr>
+        <p:spPr>
+          <a:xfrm>
+            <a:off x="7041947" y="4255892"/>
+            <a:ext cx="236048" cy="173380"/>
+          </a:xfrm>
+          <a:prstGeom prst="flowChartDecision">
+            <a:avLst/>
+          </a:prstGeom>
+          <a:solidFill>
+            <a:srgbClr val="7030A0"/>
+          </a:solidFill>
+          <a:ln w="19050">
+            <a:solidFill>
+              <a:srgbClr val="7030A0"/>
+            </a:solidFill>
+          </a:ln>
+          <a:effectLst/>
+        </p:spPr>
+        <p:style>
+          <a:lnRef idx="1">
+            <a:schemeClr val="accent6"/>
+          </a:lnRef>
+          <a:fillRef idx="2">
+            <a:schemeClr val="accent6"/>
+          </a:fillRef>
+          <a:effectRef idx="1">
+            <a:schemeClr val="accent6"/>
+          </a:effectRef>
+          <a:fontRef idx="minor">
+            <a:schemeClr val="dk1"/>
+          </a:fontRef>
+        </p:style>
+        <p:txBody>
+          <a:bodyPr rtlCol="0" anchor="ctr"/>
+          <a:lstStyle/>
+          <a:p>
+            <a:pPr algn="ctr"/>
+            <a:endParaRPr lang="en-US" sz="1050"/>
+          </a:p>
+        </p:txBody>
+      </p:sp>
+      <p:cxnSp>
+        <p:nvCxnSpPr>
+          <p:cNvPr id="116" name="Elbow Connector 115"/>
+          <p:cNvCxnSpPr/>
+          <p:nvPr/>
+        </p:nvCxnSpPr>
+        <p:spPr>
+          <a:xfrm flipV="1">
+            <a:off x="7277995" y="4339443"/>
+            <a:ext cx="434402" cy="4783"/>
+          </a:xfrm>
+          <a:prstGeom prst="bentConnector3">
+            <a:avLst/>
+          </a:prstGeom>
+          <a:ln w="19050">
+            <a:solidFill>
+              <a:srgbClr val="7030A0"/>
+            </a:solidFill>
+            <a:headEnd type="none" w="med" len="med"/>
+            <a:tailEnd type="arrow" w="med" len="med"/>
+          </a:ln>
+          <a:effectLst/>
+        </p:spPr>
+        <p:style>
+          <a:lnRef idx="1">
+            <a:schemeClr val="accent2"/>
+          </a:lnRef>
+          <a:fillRef idx="2">
+            <a:schemeClr val="accent2"/>
+          </a:fillRef>
+          <a:effectRef idx="1">
+            <a:schemeClr val="accent2"/>
+          </a:effectRef>
+          <a:fontRef idx="minor">
+            <a:schemeClr val="dk1"/>
+          </a:fontRef>
+        </p:style>
+      </p:cxnSp>
+      <p:cxnSp>
+        <p:nvCxnSpPr>
+          <p:cNvPr id="117" name="Elbow Connector 116"/>
+          <p:cNvCxnSpPr/>
+          <p:nvPr/>
+        </p:nvCxnSpPr>
+        <p:spPr>
+          <a:xfrm>
+            <a:off x="7270568" y="4343571"/>
+            <a:ext cx="434402" cy="318195"/>
+          </a:xfrm>
+          <a:prstGeom prst="bentConnector3">
+            <a:avLst/>
+          </a:prstGeom>
+          <a:ln w="19050">
+            <a:solidFill>
+              <a:srgbClr val="7030A0"/>
+            </a:solidFill>
+            <a:headEnd type="none" w="med" len="med"/>
+            <a:tailEnd type="arrow" w="med" len="med"/>
+          </a:ln>
+          <a:effectLst/>
+        </p:spPr>
+        <p:style>
+          <a:lnRef idx="1">
+            <a:schemeClr val="accent2"/>
+          </a:lnRef>
+          <a:fillRef idx="2">
+            <a:schemeClr val="accent2"/>
+          </a:fillRef>
+          <a:effectRef idx="1">
+            <a:schemeClr val="accent2"/>
+          </a:effectRef>
+          <a:fontRef idx="minor">
+            <a:schemeClr val="dk1"/>
+          </a:fontRef>
+        </p:style>
+      </p:cxnSp>
+      <p:cxnSp>
+        <p:nvCxnSpPr>
+          <p:cNvPr id="121" name="Elbow Connector 120"/>
+          <p:cNvCxnSpPr/>
+          <p:nvPr/>
+        </p:nvCxnSpPr>
+        <p:spPr>
+          <a:xfrm>
+            <a:off x="7256021" y="4339443"/>
+            <a:ext cx="434402" cy="641172"/>
+          </a:xfrm>
+          <a:prstGeom prst="bentConnector3">
+            <a:avLst/>
+          </a:prstGeom>
+          <a:ln w="19050">
+            <a:solidFill>
+              <a:srgbClr val="7030A0"/>
+            </a:solidFill>
+            <a:headEnd type="none" w="med" len="med"/>
+            <a:tailEnd type="arrow" w="med" len="med"/>
+          </a:ln>
+          <a:effectLst/>
+        </p:spPr>
+        <p:style>
+          <a:lnRef idx="1">
+            <a:schemeClr val="accent2"/>
+          </a:lnRef>
+          <a:fillRef idx="2">
+            <a:schemeClr val="accent2"/>
+          </a:fillRef>
+          <a:effectRef idx="1">
+            <a:schemeClr val="accent2"/>
+          </a:effectRef>
+          <a:fontRef idx="minor">
+            <a:schemeClr val="dk1"/>
+          </a:fontRef>
+        </p:style>
+      </p:cxnSp>
+      <p:sp>
+        <p:nvSpPr>
+          <p:cNvPr id="123" name="Rectangle 8"/>
+          <p:cNvSpPr/>
+          <p:nvPr/>
+        </p:nvSpPr>
+        <p:spPr>
+          <a:xfrm>
+            <a:off x="7704969" y="4224810"/>
+            <a:ext cx="829429" cy="285783"/>
+          </a:xfrm>
+          <a:prstGeom prst="rect">
+            <a:avLst/>
+          </a:prstGeom>
+          <a:ln w="19050">
+            <a:solidFill>
+              <a:srgbClr val="7030A0"/>
+            </a:solidFill>
+          </a:ln>
+          <a:effectLst/>
+        </p:spPr>
+        <p:style>
+          <a:lnRef idx="1">
+            <a:schemeClr val="accent4"/>
+          </a:lnRef>
+          <a:fillRef idx="2">
+            <a:schemeClr val="accent4"/>
+          </a:fillRef>
+          <a:effectRef idx="1">
+            <a:schemeClr val="accent4"/>
+          </a:effectRef>
+          <a:fontRef idx="minor">
+            <a:schemeClr val="dk1"/>
+          </a:fontRef>
+        </p:style>
+        <p:txBody>
+          <a:bodyPr rtlCol="0" anchor="ctr"/>
+          <a:lstStyle/>
+          <a:p>
+            <a:pPr algn="ctr"/>
+            <a:r>
+              <a:rPr lang="en-US" sz="1050" dirty="0" smtClean="0">
+                <a:solidFill>
+                  <a:srgbClr val="7030A0"/>
+                </a:solidFill>
+              </a:rPr>
+              <a:t>Header</a:t>
+            </a:r>
+            <a:endParaRPr lang="en-SG" sz="1050" dirty="0">
+              <a:solidFill>
+                <a:srgbClr val="7030A0"/>
+              </a:solidFill>
+            </a:endParaRPr>
+          </a:p>
+        </p:txBody>
+      </p:sp>
+      <p:sp>
+        <p:nvSpPr>
+          <p:cNvPr id="125" name="Rectangle 8"/>
+          <p:cNvSpPr/>
+          <p:nvPr/>
+        </p:nvSpPr>
+        <p:spPr>
+          <a:xfrm>
+            <a:off x="7690422" y="4535139"/>
+            <a:ext cx="843977" cy="285783"/>
+          </a:xfrm>
+          <a:prstGeom prst="rect">
+            <a:avLst/>
+          </a:prstGeom>
+          <a:ln w="19050">
+            <a:solidFill>
+              <a:srgbClr val="7030A0"/>
+            </a:solidFill>
+          </a:ln>
+          <a:effectLst/>
+        </p:spPr>
+        <p:style>
+          <a:lnRef idx="1">
+            <a:schemeClr val="accent4"/>
+          </a:lnRef>
+          <a:fillRef idx="2">
+            <a:schemeClr val="accent4"/>
+          </a:fillRef>
+          <a:effectRef idx="1">
+            <a:schemeClr val="accent4"/>
+          </a:effectRef>
+          <a:fontRef idx="minor">
+            <a:schemeClr val="dk1"/>
+          </a:fontRef>
+        </p:style>
+        <p:txBody>
+          <a:bodyPr rtlCol="0" anchor="ctr"/>
+          <a:lstStyle/>
+          <a:p>
+            <a:pPr algn="ctr"/>
+            <a:r>
+              <a:rPr lang="en-US" sz="1050" smtClean="0">
+                <a:solidFill>
+                  <a:srgbClr val="7030A0"/>
+                </a:solidFill>
+              </a:rPr>
+              <a:t>Description</a:t>
+            </a:r>
+            <a:endParaRPr lang="en-SG" sz="1050" dirty="0">
+              <a:solidFill>
+                <a:srgbClr val="7030A0"/>
+              </a:solidFill>
+            </a:endParaRPr>
+          </a:p>
+        </p:txBody>
+      </p:sp>
+      <p:sp>
+        <p:nvSpPr>
+          <p:cNvPr id="126" name="Rectangle 8"/>
+          <p:cNvSpPr/>
+          <p:nvPr/>
+        </p:nvSpPr>
+        <p:spPr>
+          <a:xfrm>
+            <a:off x="7690422" y="4856929"/>
+            <a:ext cx="843975" cy="285783"/>
+          </a:xfrm>
+          <a:prstGeom prst="rect">
+            <a:avLst/>
+          </a:prstGeom>
+          <a:ln w="19050">
+            <a:solidFill>
+              <a:srgbClr val="7030A0"/>
+            </a:solidFill>
+          </a:ln>
+          <a:effectLst/>
+        </p:spPr>
+        <p:style>
+          <a:lnRef idx="1">
+            <a:schemeClr val="accent4"/>
+          </a:lnRef>
+          <a:fillRef idx="2">
+            <a:schemeClr val="accent4"/>
+          </a:fillRef>
+          <a:effectRef idx="1">
+            <a:schemeClr val="accent4"/>
+          </a:effectRef>
+          <a:fontRef idx="minor">
+            <a:schemeClr val="dk1"/>
+          </a:fontRef>
+        </p:style>
+        <p:txBody>
+          <a:bodyPr rtlCol="0" anchor="ctr"/>
+          <a:lstStyle/>
+          <a:p>
+            <a:pPr algn="ctr"/>
+            <a:r>
+              <a:rPr lang="en-US" sz="1050" dirty="0" smtClean="0">
+                <a:solidFill>
+                  <a:srgbClr val="7030A0"/>
+                </a:solidFill>
+              </a:rPr>
+              <a:t>Deadline</a:t>
+            </a:r>
+            <a:endParaRPr lang="en-SG" sz="1050" dirty="0">
+              <a:solidFill>
+                <a:srgbClr val="7030A0"/>
+              </a:solidFill>
+            </a:endParaRPr>
+          </a:p>
+        </p:txBody>
+      </p:sp>
+      <p:cxnSp>
+        <p:nvCxnSpPr>
+          <p:cNvPr id="127" name="Elbow Connector 126"/>
+          <p:cNvCxnSpPr/>
+          <p:nvPr/>
+        </p:nvCxnSpPr>
+        <p:spPr>
+          <a:xfrm rot="16200000" flipH="1">
+            <a:off x="6576501" y="3881474"/>
+            <a:ext cx="331704" cy="251376"/>
+          </a:xfrm>
+          <a:prstGeom prst="bentConnector3">
+            <a:avLst/>
+          </a:prstGeom>
+          <a:ln w="19050">
+            <a:solidFill>
+              <a:srgbClr val="7030A0"/>
+            </a:solidFill>
+            <a:headEnd type="none" w="med" len="med"/>
+            <a:tailEnd type="arrow" w="med" len="med"/>
+          </a:ln>
+          <a:effectLst/>
+        </p:spPr>
+        <p:style>
+          <a:lnRef idx="1">
+            <a:schemeClr val="accent2"/>
+          </a:lnRef>
+          <a:fillRef idx="2">
+            <a:schemeClr val="accent2"/>
+          </a:fillRef>
+          <a:effectRef idx="1">
+            <a:schemeClr val="accent2"/>
+          </a:effectRef>
+          <a:fontRef idx="minor">
+            <a:schemeClr val="dk1"/>
+          </a:fontRef>
+        </p:style>
+      </p:cxnSp>
+      <p:sp>
+        <p:nvSpPr>
+          <p:cNvPr id="129" name="TextBox 128"/>
+          <p:cNvSpPr txBox="1"/>
+          <p:nvPr/>
+        </p:nvSpPr>
+        <p:spPr>
+          <a:xfrm>
+            <a:off x="6647724" y="4005833"/>
+            <a:ext cx="189257" cy="178683"/>
+          </a:xfrm>
+          <a:prstGeom prst="rect">
+            <a:avLst/>
+          </a:prstGeom>
+          <a:noFill/>
+        </p:spPr>
+        <p:txBody>
+          <a:bodyPr wrap="square" lIns="0" tIns="0" rIns="0" bIns="0" rtlCol="0">
+            <a:noAutofit/>
+          </a:bodyPr>
+          <a:lstStyle/>
+          <a:p>
+            <a:pPr algn="ctr"/>
+            <a:r>
+              <a:rPr lang="en-US" sz="1100" dirty="0" smtClean="0">
+                <a:solidFill>
+                  <a:srgbClr val="7030A0"/>
+                </a:solidFill>
+              </a:rPr>
+              <a:t>1</a:t>
+            </a:r>
+            <a:endParaRPr lang="en-SG" sz="1100" dirty="0">
+              <a:solidFill>
+                <a:srgbClr val="7030A0"/>
+              </a:solidFill>
+            </a:endParaRPr>
+          </a:p>
+        </p:txBody>
+      </p:sp>
+      <p:sp>
+        <p:nvSpPr>
+          <p:cNvPr id="130" name="TextBox 129"/>
+          <p:cNvSpPr txBox="1"/>
+          <p:nvPr/>
+        </p:nvSpPr>
+        <p:spPr>
+          <a:xfrm>
+            <a:off x="6117035" y="4350550"/>
+            <a:ext cx="189257" cy="178683"/>
+          </a:xfrm>
+          <a:prstGeom prst="rect">
+            <a:avLst/>
+          </a:prstGeom>
+          <a:noFill/>
+        </p:spPr>
+        <p:txBody>
+          <a:bodyPr wrap="square" lIns="0" tIns="0" rIns="0" bIns="0" rtlCol="0">
+            <a:noAutofit/>
+          </a:bodyPr>
+          <a:lstStyle/>
+          <a:p>
+            <a:pPr algn="ctr"/>
+            <a:r>
+              <a:rPr lang="en-US" sz="1100" dirty="0" smtClean="0">
+                <a:solidFill>
+                  <a:srgbClr val="7030A0"/>
+                </a:solidFill>
+              </a:rPr>
+              <a:t>*</a:t>
+            </a:r>
+            <a:endParaRPr lang="en-SG" sz="1100" dirty="0">
+              <a:solidFill>
+                <a:srgbClr val="7030A0"/>
+              </a:solidFill>
+            </a:endParaRPr>
+          </a:p>
+        </p:txBody>
+      </p:sp>
+      <p:cxnSp>
+        <p:nvCxnSpPr>
+          <p:cNvPr id="131" name="Elbow Connector 63"/>
+          <p:cNvCxnSpPr/>
+          <p:nvPr/>
+        </p:nvCxnSpPr>
+        <p:spPr>
+          <a:xfrm flipV="1">
+            <a:off x="6441139" y="4517428"/>
+            <a:ext cx="85752" cy="298852"/>
+          </a:xfrm>
+          <a:prstGeom prst="bentConnector2">
+            <a:avLst/>
+          </a:prstGeom>
+          <a:ln w="19050">
+            <a:solidFill>
+              <a:srgbClr val="7030A0"/>
+            </a:solidFill>
+            <a:prstDash val="sysDot"/>
+            <a:headEnd type="none" w="med" len="med"/>
+            <a:tailEnd type="none" w="med" len="med"/>
+          </a:ln>
+          <a:effectLst/>
+        </p:spPr>
+        <p:style>
+          <a:lnRef idx="1">
+            <a:schemeClr val="accent2"/>
+          </a:lnRef>
+          <a:fillRef idx="2">
+            <a:schemeClr val="accent2"/>
+          </a:fillRef>
+          <a:effectRef idx="1">
+            <a:schemeClr val="accent2"/>
+          </a:effectRef>
+          <a:fontRef idx="minor">
+            <a:schemeClr val="dk1"/>
+          </a:fontRef>
+        </p:style>
+      </p:cxnSp>
+      <p:sp>
+        <p:nvSpPr>
+          <p:cNvPr id="132" name="Isosceles Triangle 102"/>
+          <p:cNvSpPr/>
+          <p:nvPr/>
+        </p:nvSpPr>
+        <p:spPr>
+          <a:xfrm rot="5400000" flipV="1">
+            <a:off x="6218125" y="4729349"/>
+            <a:ext cx="270504" cy="175523"/>
+          </a:xfrm>
+          <a:prstGeom prst="triangle">
+            <a:avLst/>
+          </a:prstGeom>
+          <a:solidFill>
+            <a:srgbClr val="7030A0"/>
+          </a:solidFill>
+          <a:ln w="19050">
+            <a:solidFill>
+              <a:srgbClr val="7030A0"/>
+            </a:solidFill>
+          </a:ln>
+          <a:effectLst/>
+        </p:spPr>
+        <p:style>
+          <a:lnRef idx="1">
+            <a:schemeClr val="accent4"/>
+          </a:lnRef>
+          <a:fillRef idx="2">
+            <a:schemeClr val="accent4"/>
+          </a:fillRef>
+          <a:effectRef idx="1">
+            <a:schemeClr val="accent4"/>
+          </a:effectRef>
+          <a:fontRef idx="minor">
+            <a:schemeClr val="dk1"/>
+          </a:fontRef>
+        </p:style>
+        <p:txBody>
+          <a:bodyPr rtlCol="0" anchor="ctr"/>
+          <a:lstStyle/>
+          <a:p>
+            <a:pPr algn="ctr"/>
+            <a:endParaRPr lang="en-SG" sz="1050" b="1">
+              <a:solidFill>
+                <a:srgbClr val="92D050"/>
+              </a:solidFill>
+            </a:endParaRPr>
+          </a:p>
+        </p:txBody>
+      </p:sp>
+      <p:sp>
+        <p:nvSpPr>
+          <p:cNvPr id="133" name="Rectangle 8"/>
+          <p:cNvSpPr/>
+          <p:nvPr/>
+        </p:nvSpPr>
+        <p:spPr>
+          <a:xfrm>
+            <a:off x="5101372" y="4677125"/>
+            <a:ext cx="1156969" cy="346760"/>
+          </a:xfrm>
+          <a:prstGeom prst="rect">
+            <a:avLst/>
+          </a:prstGeom>
+          <a:ln w="19050">
+            <a:solidFill>
+              <a:srgbClr val="7030A0"/>
+            </a:solidFill>
+          </a:ln>
+          <a:effectLst/>
+        </p:spPr>
+        <p:style>
+          <a:lnRef idx="1">
+            <a:schemeClr val="accent4"/>
+          </a:lnRef>
+          <a:fillRef idx="2">
+            <a:schemeClr val="accent4"/>
+          </a:fillRef>
+          <a:effectRef idx="1">
+            <a:schemeClr val="accent4"/>
+          </a:effectRef>
+          <a:fontRef idx="minor">
+            <a:schemeClr val="dk1"/>
+          </a:fontRef>
+        </p:style>
+        <p:txBody>
+          <a:bodyPr rtlCol="0" anchor="ctr"/>
+          <a:lstStyle/>
+          <a:p>
+            <a:pPr algn="ctr"/>
+            <a:r>
+              <a:rPr lang="en-US" sz="1050" dirty="0" smtClean="0">
+                <a:solidFill>
+                  <a:srgbClr val="7030A0"/>
+                </a:solidFill>
+              </a:rPr>
+              <a:t>&lt;&lt;interface&gt;&gt;</a:t>
+            </a:r>
+            <a:br>
+              <a:rPr lang="en-US" sz="1050" dirty="0" smtClean="0">
+                <a:solidFill>
+                  <a:srgbClr val="7030A0"/>
+                </a:solidFill>
+              </a:rPr>
+            </a:br>
+            <a:r>
+              <a:rPr lang="en-US" sz="1050" dirty="0" err="1" smtClean="0">
+                <a:solidFill>
+                  <a:srgbClr val="7030A0"/>
+                </a:solidFill>
+              </a:rPr>
+              <a:t>ReadOnlyTask</a:t>
+            </a:r>
+            <a:endParaRPr lang="en-SG" sz="1050" dirty="0">
+              <a:solidFill>
+                <a:srgbClr val="7030A0"/>
+              </a:solidFill>
+            </a:endParaRPr>
+          </a:p>
+        </p:txBody>
+      </p:sp>
     </p:spTree>
     <p:extLst>
       <p:ext uri="{BB962C8B-B14F-4D97-AF65-F5344CB8AC3E}">

</xml_diff>